<commit_message>
update text on card
</commit_message>
<xml_diff>
--- a/public_html/copyright free pics/business card_yuan.pptx
+++ b/public_html/copyright free pics/business card_yuan.pptx
@@ -3035,7 +3035,7 @@
         <p:spPr>
           <a:xfrm>
             <a:off x="1732673" y="2987862"/>
-            <a:ext cx="28968123" cy="1569660"/>
+            <a:ext cx="26792847" cy="1569660"/>
           </a:xfrm>
           <a:prstGeom prst="rect">
             <a:avLst/>
@@ -3049,9 +3049,10 @@
           <a:lstStyle/>
           <a:p>
             <a:r>
-              <a:rPr lang="en-US" altLang="zh-CN" sz="9600" b="1" dirty="0" smtClean="0"/>
-              <a:t>Create a DC cycling safety map collectively in just 2 steps</a:t>
+              <a:rPr lang="en-US" altLang="zh-CN" sz="9600" b="1" dirty="0"/>
+              <a:t>Help us create DC’s cycling safety map in just 2 steps</a:t>
             </a:r>
+            <a:endParaRPr lang="en-US" altLang="zh-CN" sz="9600" b="1" dirty="0" smtClean="0"/>
           </a:p>
         </p:txBody>
       </p:sp>
@@ -3137,8 +3138,8 @@
         </p:nvSpPr>
         <p:spPr>
           <a:xfrm>
-            <a:off x="2497339" y="8887915"/>
-            <a:ext cx="27891866" cy="1569660"/>
+            <a:off x="1540215" y="8887915"/>
+            <a:ext cx="29323733" cy="1569660"/>
           </a:xfrm>
           <a:prstGeom prst="rect">
             <a:avLst/>
@@ -3152,18 +3153,13 @@
           <a:p>
             <a:pPr lvl="0"/>
             <a:r>
-              <a:rPr lang="en-US" altLang="zh-CN" sz="9600" dirty="0" smtClean="0">
+              <a:rPr lang="en-US" altLang="zh-CN" sz="9600" dirty="0">
                 <a:solidFill>
                   <a:prstClr val="black"/>
                 </a:solidFill>
               </a:rPr>
-              <a:t>Rate whenever you want, even with your mobile device</a:t>
+              <a:t>We will raffle twelve $25 gift cards among all participants. </a:t>
             </a:r>
-            <a:endParaRPr lang="en-US" altLang="zh-CN" sz="9600" dirty="0">
-              <a:solidFill>
-                <a:prstClr val="black"/>
-              </a:solidFill>
-            </a:endParaRPr>
           </a:p>
         </p:txBody>
       </p:sp>
@@ -3175,8 +3171,8 @@
         </p:nvSpPr>
         <p:spPr>
           <a:xfrm>
-            <a:off x="3469391" y="11909061"/>
-            <a:ext cx="26849851" cy="1631216"/>
+            <a:off x="3469391" y="11513190"/>
+            <a:ext cx="25762950" cy="1631216"/>
           </a:xfrm>
           <a:prstGeom prst="rect">
             <a:avLst/>
@@ -3195,15 +3191,7 @@
                   <a:prstClr val="black"/>
                 </a:solidFill>
               </a:rPr>
-              <a:t>Starts Now</a:t>
-            </a:r>
-            <a:r>
-              <a:rPr lang="en-US" altLang="zh-CN" sz="10000" dirty="0">
-                <a:solidFill>
-                  <a:prstClr val="black"/>
-                </a:solidFill>
-              </a:rPr>
-              <a:t> </a:t>
+              <a:t>Participate:</a:t>
             </a:r>
             <a:r>
               <a:rPr lang="en-US" altLang="zh-CN" sz="10000" dirty="0" smtClean="0">
@@ -3211,7 +3199,7 @@
                   <a:prstClr val="black"/>
                 </a:solidFill>
               </a:rPr>
-              <a:t>at </a:t>
+              <a:t> </a:t>
             </a:r>
             <a:r>
               <a:rPr lang="en-US" altLang="zh-CN" sz="10000" b="1" dirty="0" smtClean="0">
@@ -3310,7 +3298,7 @@
         </p:blipFill>
         <p:spPr>
           <a:xfrm>
-            <a:off x="1449357" y="12133700"/>
+            <a:off x="1449357" y="11737829"/>
             <a:ext cx="1770581" cy="1085260"/>
           </a:xfrm>
           <a:prstGeom prst="rect">
@@ -18091,8 +18079,8 @@
         </p:nvSpPr>
         <p:spPr>
           <a:xfrm>
-            <a:off x="3136991" y="7797339"/>
-            <a:ext cx="25466459" cy="2323713"/>
+            <a:off x="2228349" y="8059087"/>
+            <a:ext cx="27547301" cy="2169825"/>
           </a:xfrm>
           <a:prstGeom prst="rect">
             <a:avLst/>
@@ -18100,21 +18088,21 @@
           <a:noFill/>
         </p:spPr>
         <p:txBody>
-          <a:bodyPr wrap="none" rtlCol="0">
+          <a:bodyPr wrap="square" rtlCol="0">
             <a:spAutoFit/>
           </a:bodyPr>
           <a:lstStyle/>
           <a:p>
             <a:r>
-              <a:rPr lang="en-US" altLang="zh-CN" sz="14500" b="1" dirty="0" smtClean="0">
+              <a:rPr lang="en-US" altLang="zh-CN" sz="13000" b="1" dirty="0" smtClean="0">
                 <a:solidFill>
                   <a:schemeClr val="bg1"/>
                 </a:solidFill>
                 <a:ea typeface="Kozuka Gothic Pr6N EL" panose="020B0200000000000000" pitchFamily="34" charset="-128"/>
               </a:rPr>
-              <a:t>Make our city more bike-friendly</a:t>
+              <a:t>Help make our cities more bike-friendly</a:t>
             </a:r>
-            <a:endParaRPr lang="zh-CN" altLang="en-US" sz="14500" b="1" dirty="0">
+            <a:endParaRPr lang="zh-CN" altLang="en-US" sz="13000" b="1" dirty="0">
               <a:solidFill>
                 <a:schemeClr val="bg1"/>
               </a:solidFill>

</xml_diff>